<commit_message>
Tweak topics: SDLC intro, testing intro, OOP intro
</commit_message>
<xml_diff>
--- a/diagrams/processModels/introduction/iterativeModels/diagram.pptx
+++ b/diagrams/processModels/introduction/iterativeModels/diagram.pptx
@@ -104,6 +104,22 @@
       </a:defRPr>
     </a:lvl9pPr>
   </p:defaultTextStyle>
+  <p:extLst>
+    <p:ext uri="{EFAFB233-063F-42B5-8137-9DF3F51BA10A}">
+      <p15:sldGuideLst xmlns:p15="http://schemas.microsoft.com/office/powerpoint/2012/main">
+        <p15:guide id="1" orient="horz" pos="2160">
+          <p15:clr>
+            <a:srgbClr val="A4A3A4"/>
+          </p15:clr>
+        </p15:guide>
+        <p15:guide id="2" pos="2880">
+          <p15:clr>
+            <a:srgbClr val="A4A3A4"/>
+          </p15:clr>
+        </p15:guide>
+      </p15:sldGuideLst>
+    </p:ext>
+  </p:extLst>
 </p:presentation>
 </file>
 
@@ -145,7 +161,7 @@
           <a:lstStyle/>
           <a:p>
             <a:r>
-              <a:rPr lang="en-US" smtClean="0"/>
+              <a:rPr lang="en-US"/>
               <a:t>Click to edit Master title style</a:t>
             </a:r>
             <a:endParaRPr lang="en-SG"/>
@@ -264,7 +280,7 @@
           </a:lstStyle>
           <a:p>
             <a:r>
-              <a:rPr lang="en-US" smtClean="0"/>
+              <a:rPr lang="en-US"/>
               <a:t>Click to edit Master subtitle style</a:t>
             </a:r>
             <a:endParaRPr lang="en-SG"/>
@@ -288,7 +304,7 @@
           <a:p>
             <a:fld id="{DC27D1C9-A33C-494A-A1A4-DF414EBC08C6}" type="datetimeFigureOut">
               <a:rPr lang="en-SG" smtClean="0"/>
-              <a:t>11/7/2017</a:t>
+              <a:t>8/7/2023</a:t>
             </a:fld>
             <a:endParaRPr lang="en-SG"/>
           </a:p>
@@ -382,7 +398,7 @@
           <a:lstStyle/>
           <a:p>
             <a:r>
-              <a:rPr lang="en-US" smtClean="0"/>
+              <a:rPr lang="en-US"/>
               <a:t>Click to edit Master title style</a:t>
             </a:r>
             <a:endParaRPr lang="en-SG"/>
@@ -406,35 +422,35 @@
           <a:p>
             <a:pPr lvl="0"/>
             <a:r>
-              <a:rPr lang="en-US" smtClean="0"/>
+              <a:rPr lang="en-US"/>
               <a:t>Click to edit Master text styles</a:t>
             </a:r>
           </a:p>
           <a:p>
             <a:pPr lvl="1"/>
             <a:r>
-              <a:rPr lang="en-US" smtClean="0"/>
+              <a:rPr lang="en-US"/>
               <a:t>Second level</a:t>
             </a:r>
           </a:p>
           <a:p>
             <a:pPr lvl="2"/>
             <a:r>
-              <a:rPr lang="en-US" smtClean="0"/>
+              <a:rPr lang="en-US"/>
               <a:t>Third level</a:t>
             </a:r>
           </a:p>
           <a:p>
             <a:pPr lvl="3"/>
             <a:r>
-              <a:rPr lang="en-US" smtClean="0"/>
+              <a:rPr lang="en-US"/>
               <a:t>Fourth level</a:t>
             </a:r>
           </a:p>
           <a:p>
             <a:pPr lvl="4"/>
             <a:r>
-              <a:rPr lang="en-US" smtClean="0"/>
+              <a:rPr lang="en-US"/>
               <a:t>Fifth level</a:t>
             </a:r>
             <a:endParaRPr lang="en-SG"/>
@@ -458,7 +474,7 @@
           <a:p>
             <a:fld id="{DC27D1C9-A33C-494A-A1A4-DF414EBC08C6}" type="datetimeFigureOut">
               <a:rPr lang="en-SG" smtClean="0"/>
-              <a:t>11/7/2017</a:t>
+              <a:t>8/7/2023</a:t>
             </a:fld>
             <a:endParaRPr lang="en-SG"/>
           </a:p>
@@ -557,7 +573,7 @@
           <a:lstStyle/>
           <a:p>
             <a:r>
-              <a:rPr lang="en-US" smtClean="0"/>
+              <a:rPr lang="en-US"/>
               <a:t>Click to edit Master title style</a:t>
             </a:r>
             <a:endParaRPr lang="en-SG"/>
@@ -586,35 +602,35 @@
           <a:p>
             <a:pPr lvl="0"/>
             <a:r>
-              <a:rPr lang="en-US" smtClean="0"/>
+              <a:rPr lang="en-US"/>
               <a:t>Click to edit Master text styles</a:t>
             </a:r>
           </a:p>
           <a:p>
             <a:pPr lvl="1"/>
             <a:r>
-              <a:rPr lang="en-US" smtClean="0"/>
+              <a:rPr lang="en-US"/>
               <a:t>Second level</a:t>
             </a:r>
           </a:p>
           <a:p>
             <a:pPr lvl="2"/>
             <a:r>
-              <a:rPr lang="en-US" smtClean="0"/>
+              <a:rPr lang="en-US"/>
               <a:t>Third level</a:t>
             </a:r>
           </a:p>
           <a:p>
             <a:pPr lvl="3"/>
             <a:r>
-              <a:rPr lang="en-US" smtClean="0"/>
+              <a:rPr lang="en-US"/>
               <a:t>Fourth level</a:t>
             </a:r>
           </a:p>
           <a:p>
             <a:pPr lvl="4"/>
             <a:r>
-              <a:rPr lang="en-US" smtClean="0"/>
+              <a:rPr lang="en-US"/>
               <a:t>Fifth level</a:t>
             </a:r>
             <a:endParaRPr lang="en-SG"/>
@@ -638,7 +654,7 @@
           <a:p>
             <a:fld id="{DC27D1C9-A33C-494A-A1A4-DF414EBC08C6}" type="datetimeFigureOut">
               <a:rPr lang="en-SG" smtClean="0"/>
-              <a:t>11/7/2017</a:t>
+              <a:t>8/7/2023</a:t>
             </a:fld>
             <a:endParaRPr lang="en-SG"/>
           </a:p>
@@ -732,7 +748,7 @@
           <a:lstStyle/>
           <a:p>
             <a:r>
-              <a:rPr lang="en-US" smtClean="0"/>
+              <a:rPr lang="en-US"/>
               <a:t>Click to edit Master title style</a:t>
             </a:r>
             <a:endParaRPr lang="en-SG"/>
@@ -756,35 +772,35 @@
           <a:p>
             <a:pPr lvl="0"/>
             <a:r>
-              <a:rPr lang="en-US" smtClean="0"/>
+              <a:rPr lang="en-US"/>
               <a:t>Click to edit Master text styles</a:t>
             </a:r>
           </a:p>
           <a:p>
             <a:pPr lvl="1"/>
             <a:r>
-              <a:rPr lang="en-US" smtClean="0"/>
+              <a:rPr lang="en-US"/>
               <a:t>Second level</a:t>
             </a:r>
           </a:p>
           <a:p>
             <a:pPr lvl="2"/>
             <a:r>
-              <a:rPr lang="en-US" smtClean="0"/>
+              <a:rPr lang="en-US"/>
               <a:t>Third level</a:t>
             </a:r>
           </a:p>
           <a:p>
             <a:pPr lvl="3"/>
             <a:r>
-              <a:rPr lang="en-US" smtClean="0"/>
+              <a:rPr lang="en-US"/>
               <a:t>Fourth level</a:t>
             </a:r>
           </a:p>
           <a:p>
             <a:pPr lvl="4"/>
             <a:r>
-              <a:rPr lang="en-US" smtClean="0"/>
+              <a:rPr lang="en-US"/>
               <a:t>Fifth level</a:t>
             </a:r>
             <a:endParaRPr lang="en-SG"/>
@@ -808,7 +824,7 @@
           <a:p>
             <a:fld id="{DC27D1C9-A33C-494A-A1A4-DF414EBC08C6}" type="datetimeFigureOut">
               <a:rPr lang="en-SG" smtClean="0"/>
-              <a:t>11/7/2017</a:t>
+              <a:t>8/7/2023</a:t>
             </a:fld>
             <a:endParaRPr lang="en-SG"/>
           </a:p>
@@ -911,7 +927,7 @@
           </a:lstStyle>
           <a:p>
             <a:r>
-              <a:rPr lang="en-US" smtClean="0"/>
+              <a:rPr lang="en-US"/>
               <a:t>Click to edit Master title style</a:t>
             </a:r>
             <a:endParaRPr lang="en-SG"/>
@@ -1031,7 +1047,7 @@
           <a:p>
             <a:pPr lvl="0"/>
             <a:r>
-              <a:rPr lang="en-US" smtClean="0"/>
+              <a:rPr lang="en-US"/>
               <a:t>Click to edit Master text styles</a:t>
             </a:r>
           </a:p>
@@ -1054,7 +1070,7 @@
           <a:p>
             <a:fld id="{DC27D1C9-A33C-494A-A1A4-DF414EBC08C6}" type="datetimeFigureOut">
               <a:rPr lang="en-SG" smtClean="0"/>
-              <a:t>11/7/2017</a:t>
+              <a:t>8/7/2023</a:t>
             </a:fld>
             <a:endParaRPr lang="en-SG"/>
           </a:p>
@@ -1148,7 +1164,7 @@
           <a:lstStyle/>
           <a:p>
             <a:r>
-              <a:rPr lang="en-US" smtClean="0"/>
+              <a:rPr lang="en-US"/>
               <a:t>Click to edit Master title style</a:t>
             </a:r>
             <a:endParaRPr lang="en-SG"/>
@@ -1205,35 +1221,35 @@
           <a:p>
             <a:pPr lvl="0"/>
             <a:r>
-              <a:rPr lang="en-US" smtClean="0"/>
+              <a:rPr lang="en-US"/>
               <a:t>Click to edit Master text styles</a:t>
             </a:r>
           </a:p>
           <a:p>
             <a:pPr lvl="1"/>
             <a:r>
-              <a:rPr lang="en-US" smtClean="0"/>
+              <a:rPr lang="en-US"/>
               <a:t>Second level</a:t>
             </a:r>
           </a:p>
           <a:p>
             <a:pPr lvl="2"/>
             <a:r>
-              <a:rPr lang="en-US" smtClean="0"/>
+              <a:rPr lang="en-US"/>
               <a:t>Third level</a:t>
             </a:r>
           </a:p>
           <a:p>
             <a:pPr lvl="3"/>
             <a:r>
-              <a:rPr lang="en-US" smtClean="0"/>
+              <a:rPr lang="en-US"/>
               <a:t>Fourth level</a:t>
             </a:r>
           </a:p>
           <a:p>
             <a:pPr lvl="4"/>
             <a:r>
-              <a:rPr lang="en-US" smtClean="0"/>
+              <a:rPr lang="en-US"/>
               <a:t>Fifth level</a:t>
             </a:r>
             <a:endParaRPr lang="en-SG"/>
@@ -1290,35 +1306,35 @@
           <a:p>
             <a:pPr lvl="0"/>
             <a:r>
-              <a:rPr lang="en-US" smtClean="0"/>
+              <a:rPr lang="en-US"/>
               <a:t>Click to edit Master text styles</a:t>
             </a:r>
           </a:p>
           <a:p>
             <a:pPr lvl="1"/>
             <a:r>
-              <a:rPr lang="en-US" smtClean="0"/>
+              <a:rPr lang="en-US"/>
               <a:t>Second level</a:t>
             </a:r>
           </a:p>
           <a:p>
             <a:pPr lvl="2"/>
             <a:r>
-              <a:rPr lang="en-US" smtClean="0"/>
+              <a:rPr lang="en-US"/>
               <a:t>Third level</a:t>
             </a:r>
           </a:p>
           <a:p>
             <a:pPr lvl="3"/>
             <a:r>
-              <a:rPr lang="en-US" smtClean="0"/>
+              <a:rPr lang="en-US"/>
               <a:t>Fourth level</a:t>
             </a:r>
           </a:p>
           <a:p>
             <a:pPr lvl="4"/>
             <a:r>
-              <a:rPr lang="en-US" smtClean="0"/>
+              <a:rPr lang="en-US"/>
               <a:t>Fifth level</a:t>
             </a:r>
             <a:endParaRPr lang="en-SG"/>
@@ -1342,7 +1358,7 @@
           <a:p>
             <a:fld id="{DC27D1C9-A33C-494A-A1A4-DF414EBC08C6}" type="datetimeFigureOut">
               <a:rPr lang="en-SG" smtClean="0"/>
-              <a:t>11/7/2017</a:t>
+              <a:t>8/7/2023</a:t>
             </a:fld>
             <a:endParaRPr lang="en-SG"/>
           </a:p>
@@ -1440,7 +1456,7 @@
           </a:lstStyle>
           <a:p>
             <a:r>
-              <a:rPr lang="en-US" smtClean="0"/>
+              <a:rPr lang="en-US"/>
               <a:t>Click to edit Master title style</a:t>
             </a:r>
             <a:endParaRPr lang="en-SG"/>
@@ -1506,7 +1522,7 @@
           <a:p>
             <a:pPr lvl="0"/>
             <a:r>
-              <a:rPr lang="en-US" smtClean="0"/>
+              <a:rPr lang="en-US"/>
               <a:t>Click to edit Master text styles</a:t>
             </a:r>
           </a:p>
@@ -1562,35 +1578,35 @@
           <a:p>
             <a:pPr lvl="0"/>
             <a:r>
-              <a:rPr lang="en-US" smtClean="0"/>
+              <a:rPr lang="en-US"/>
               <a:t>Click to edit Master text styles</a:t>
             </a:r>
           </a:p>
           <a:p>
             <a:pPr lvl="1"/>
             <a:r>
-              <a:rPr lang="en-US" smtClean="0"/>
+              <a:rPr lang="en-US"/>
               <a:t>Second level</a:t>
             </a:r>
           </a:p>
           <a:p>
             <a:pPr lvl="2"/>
             <a:r>
-              <a:rPr lang="en-US" smtClean="0"/>
+              <a:rPr lang="en-US"/>
               <a:t>Third level</a:t>
             </a:r>
           </a:p>
           <a:p>
             <a:pPr lvl="3"/>
             <a:r>
-              <a:rPr lang="en-US" smtClean="0"/>
+              <a:rPr lang="en-US"/>
               <a:t>Fourth level</a:t>
             </a:r>
           </a:p>
           <a:p>
             <a:pPr lvl="4"/>
             <a:r>
-              <a:rPr lang="en-US" smtClean="0"/>
+              <a:rPr lang="en-US"/>
               <a:t>Fifth level</a:t>
             </a:r>
             <a:endParaRPr lang="en-SG"/>
@@ -1656,7 +1672,7 @@
           <a:p>
             <a:pPr lvl="0"/>
             <a:r>
-              <a:rPr lang="en-US" smtClean="0"/>
+              <a:rPr lang="en-US"/>
               <a:t>Click to edit Master text styles</a:t>
             </a:r>
           </a:p>
@@ -1712,35 +1728,35 @@
           <a:p>
             <a:pPr lvl="0"/>
             <a:r>
-              <a:rPr lang="en-US" smtClean="0"/>
+              <a:rPr lang="en-US"/>
               <a:t>Click to edit Master text styles</a:t>
             </a:r>
           </a:p>
           <a:p>
             <a:pPr lvl="1"/>
             <a:r>
-              <a:rPr lang="en-US" smtClean="0"/>
+              <a:rPr lang="en-US"/>
               <a:t>Second level</a:t>
             </a:r>
           </a:p>
           <a:p>
             <a:pPr lvl="2"/>
             <a:r>
-              <a:rPr lang="en-US" smtClean="0"/>
+              <a:rPr lang="en-US"/>
               <a:t>Third level</a:t>
             </a:r>
           </a:p>
           <a:p>
             <a:pPr lvl="3"/>
             <a:r>
-              <a:rPr lang="en-US" smtClean="0"/>
+              <a:rPr lang="en-US"/>
               <a:t>Fourth level</a:t>
             </a:r>
           </a:p>
           <a:p>
             <a:pPr lvl="4"/>
             <a:r>
-              <a:rPr lang="en-US" smtClean="0"/>
+              <a:rPr lang="en-US"/>
               <a:t>Fifth level</a:t>
             </a:r>
             <a:endParaRPr lang="en-SG"/>
@@ -1764,7 +1780,7 @@
           <a:p>
             <a:fld id="{DC27D1C9-A33C-494A-A1A4-DF414EBC08C6}" type="datetimeFigureOut">
               <a:rPr lang="en-SG" smtClean="0"/>
-              <a:t>11/7/2017</a:t>
+              <a:t>8/7/2023</a:t>
             </a:fld>
             <a:endParaRPr lang="en-SG"/>
           </a:p>
@@ -1858,7 +1874,7 @@
           <a:lstStyle/>
           <a:p>
             <a:r>
-              <a:rPr lang="en-US" smtClean="0"/>
+              <a:rPr lang="en-US"/>
               <a:t>Click to edit Master title style</a:t>
             </a:r>
             <a:endParaRPr lang="en-SG"/>
@@ -1882,7 +1898,7 @@
           <a:p>
             <a:fld id="{DC27D1C9-A33C-494A-A1A4-DF414EBC08C6}" type="datetimeFigureOut">
               <a:rPr lang="en-SG" smtClean="0"/>
-              <a:t>11/7/2017</a:t>
+              <a:t>8/7/2023</a:t>
             </a:fld>
             <a:endParaRPr lang="en-SG"/>
           </a:p>
@@ -1977,7 +1993,7 @@
           <a:p>
             <a:fld id="{DC27D1C9-A33C-494A-A1A4-DF414EBC08C6}" type="datetimeFigureOut">
               <a:rPr lang="en-SG" smtClean="0"/>
-              <a:t>11/7/2017</a:t>
+              <a:t>8/7/2023</a:t>
             </a:fld>
             <a:endParaRPr lang="en-SG"/>
           </a:p>
@@ -2080,7 +2096,7 @@
           </a:lstStyle>
           <a:p>
             <a:r>
-              <a:rPr lang="en-US" smtClean="0"/>
+              <a:rPr lang="en-US"/>
               <a:t>Click to edit Master title style</a:t>
             </a:r>
             <a:endParaRPr lang="en-SG"/>
@@ -2137,35 +2153,35 @@
           <a:p>
             <a:pPr lvl="0"/>
             <a:r>
-              <a:rPr lang="en-US" smtClean="0"/>
+              <a:rPr lang="en-US"/>
               <a:t>Click to edit Master text styles</a:t>
             </a:r>
           </a:p>
           <a:p>
             <a:pPr lvl="1"/>
             <a:r>
-              <a:rPr lang="en-US" smtClean="0"/>
+              <a:rPr lang="en-US"/>
               <a:t>Second level</a:t>
             </a:r>
           </a:p>
           <a:p>
             <a:pPr lvl="2"/>
             <a:r>
-              <a:rPr lang="en-US" smtClean="0"/>
+              <a:rPr lang="en-US"/>
               <a:t>Third level</a:t>
             </a:r>
           </a:p>
           <a:p>
             <a:pPr lvl="3"/>
             <a:r>
-              <a:rPr lang="en-US" smtClean="0"/>
+              <a:rPr lang="en-US"/>
               <a:t>Fourth level</a:t>
             </a:r>
           </a:p>
           <a:p>
             <a:pPr lvl="4"/>
             <a:r>
-              <a:rPr lang="en-US" smtClean="0"/>
+              <a:rPr lang="en-US"/>
               <a:t>Fifth level</a:t>
             </a:r>
             <a:endParaRPr lang="en-SG"/>
@@ -2231,7 +2247,7 @@
           <a:p>
             <a:pPr lvl="0"/>
             <a:r>
-              <a:rPr lang="en-US" smtClean="0"/>
+              <a:rPr lang="en-US"/>
               <a:t>Click to edit Master text styles</a:t>
             </a:r>
           </a:p>
@@ -2254,7 +2270,7 @@
           <a:p>
             <a:fld id="{DC27D1C9-A33C-494A-A1A4-DF414EBC08C6}" type="datetimeFigureOut">
               <a:rPr lang="en-SG" smtClean="0"/>
-              <a:t>11/7/2017</a:t>
+              <a:t>8/7/2023</a:t>
             </a:fld>
             <a:endParaRPr lang="en-SG"/>
           </a:p>
@@ -2357,7 +2373,7 @@
           </a:lstStyle>
           <a:p>
             <a:r>
-              <a:rPr lang="en-US" smtClean="0"/>
+              <a:rPr lang="en-US"/>
               <a:t>Click to edit Master title style</a:t>
             </a:r>
             <a:endParaRPr lang="en-SG"/>
@@ -2484,7 +2500,7 @@
           <a:p>
             <a:pPr lvl="0"/>
             <a:r>
-              <a:rPr lang="en-US" smtClean="0"/>
+              <a:rPr lang="en-US"/>
               <a:t>Click to edit Master text styles</a:t>
             </a:r>
           </a:p>
@@ -2507,7 +2523,7 @@
           <a:p>
             <a:fld id="{DC27D1C9-A33C-494A-A1A4-DF414EBC08C6}" type="datetimeFigureOut">
               <a:rPr lang="en-SG" smtClean="0"/>
-              <a:t>11/7/2017</a:t>
+              <a:t>8/7/2023</a:t>
             </a:fld>
             <a:endParaRPr lang="en-SG"/>
           </a:p>
@@ -2616,7 +2632,7 @@
           <a:lstStyle/>
           <a:p>
             <a:r>
-              <a:rPr lang="en-US" smtClean="0"/>
+              <a:rPr lang="en-US"/>
               <a:t>Click to edit Master title style</a:t>
             </a:r>
             <a:endParaRPr lang="en-SG"/>
@@ -2650,35 +2666,35 @@
           <a:p>
             <a:pPr lvl="0"/>
             <a:r>
-              <a:rPr lang="en-US" smtClean="0"/>
+              <a:rPr lang="en-US"/>
               <a:t>Click to edit Master text styles</a:t>
             </a:r>
           </a:p>
           <a:p>
             <a:pPr lvl="1"/>
             <a:r>
-              <a:rPr lang="en-US" smtClean="0"/>
+              <a:rPr lang="en-US"/>
               <a:t>Second level</a:t>
             </a:r>
           </a:p>
           <a:p>
             <a:pPr lvl="2"/>
             <a:r>
-              <a:rPr lang="en-US" smtClean="0"/>
+              <a:rPr lang="en-US"/>
               <a:t>Third level</a:t>
             </a:r>
           </a:p>
           <a:p>
             <a:pPr lvl="3"/>
             <a:r>
-              <a:rPr lang="en-US" smtClean="0"/>
+              <a:rPr lang="en-US"/>
               <a:t>Fourth level</a:t>
             </a:r>
           </a:p>
           <a:p>
             <a:pPr lvl="4"/>
             <a:r>
-              <a:rPr lang="en-US" smtClean="0"/>
+              <a:rPr lang="en-US"/>
               <a:t>Fifth level</a:t>
             </a:r>
             <a:endParaRPr lang="en-SG"/>
@@ -2720,7 +2736,7 @@
           <a:p>
             <a:fld id="{DC27D1C9-A33C-494A-A1A4-DF414EBC08C6}" type="datetimeFigureOut">
               <a:rPr lang="en-SG" smtClean="0"/>
-              <a:t>11/7/2017</a:t>
+              <a:t>8/7/2023</a:t>
             </a:fld>
             <a:endParaRPr lang="en-SG"/>
           </a:p>
@@ -3097,16 +3113,99 @@
       </p:grpSpPr>
       <p:sp>
         <p:nvSpPr>
-          <p:cNvPr id="19" name="Rectangle 18"/>
+          <p:cNvPr id="25" name="Folded Corner 24"/>
           <p:cNvSpPr/>
           <p:nvPr/>
         </p:nvSpPr>
         <p:spPr>
           <a:xfrm>
-            <a:off x="5305003" y="3016642"/>
-            <a:ext cx="2362200" cy="990600"/>
+            <a:off x="1511149" y="4180248"/>
+            <a:ext cx="733642" cy="350258"/>
+          </a:xfrm>
+          <a:prstGeom prst="cube">
+            <a:avLst/>
+          </a:prstGeom>
+        </p:spPr>
+        <p:style>
+          <a:lnRef idx="1">
+            <a:schemeClr val="accent6"/>
+          </a:lnRef>
+          <a:fillRef idx="2">
+            <a:schemeClr val="accent6"/>
+          </a:fillRef>
+          <a:effectRef idx="1">
+            <a:schemeClr val="accent6"/>
+          </a:effectRef>
+          <a:fontRef idx="minor">
+            <a:schemeClr val="dk1"/>
+          </a:fontRef>
+        </p:style>
+        <p:txBody>
+          <a:bodyPr rtlCol="0" anchor="ctr"/>
+          <a:lstStyle/>
+          <a:p>
+            <a:pPr algn="ctr"/>
+            <a:r>
+              <a:rPr lang="en-US" sz="1800" dirty="0">
+                <a:solidFill>
+                  <a:schemeClr val="tx1"/>
+                </a:solidFill>
+              </a:rPr>
+              <a:t>V0.1</a:t>
+            </a:r>
+          </a:p>
+        </p:txBody>
+      </p:sp>
+      <p:sp>
+        <p:nvSpPr>
+          <p:cNvPr id="33" name="Rectangle 32"/>
+          <p:cNvSpPr/>
+          <p:nvPr/>
+        </p:nvSpPr>
+        <p:spPr>
+          <a:xfrm>
+            <a:off x="2353136" y="4110986"/>
+            <a:ext cx="1036502" cy="369332"/>
           </a:xfrm>
           <a:prstGeom prst="rect">
+            <a:avLst/>
+          </a:prstGeom>
+        </p:spPr>
+        <p:txBody>
+          <a:bodyPr wrap="none">
+            <a:spAutoFit/>
+          </a:bodyPr>
+          <a:lstStyle/>
+          <a:p>
+            <a:r>
+              <a:rPr lang="en-US" sz="1800" dirty="0">
+                <a:solidFill>
+                  <a:srgbClr val="0070C0"/>
+                </a:solidFill>
+              </a:rPr>
+              <a:t>feedback</a:t>
+            </a:r>
+          </a:p>
+        </p:txBody>
+      </p:sp>
+      <p:sp>
+        <p:nvSpPr>
+          <p:cNvPr id="2" name="Rectangle: Rounded Corners 1">
+            <a:extLst>
+              <a:ext uri="{FF2B5EF4-FFF2-40B4-BE49-F238E27FC236}">
+                <a16:creationId xmlns:a16="http://schemas.microsoft.com/office/drawing/2014/main" id="{EA976329-F11E-4F46-8A9A-CE16401AC1F7}"/>
+              </a:ext>
+            </a:extLst>
+          </p:cNvPr>
+          <p:cNvSpPr/>
+          <p:nvPr/>
+        </p:nvSpPr>
+        <p:spPr>
+          <a:xfrm>
+            <a:off x="395536" y="3356992"/>
+            <a:ext cx="1080120" cy="617806"/>
+          </a:xfrm>
+          <a:prstGeom prst="roundRect">
             <a:avLst/>
           </a:prstGeom>
         </p:spPr>
@@ -3130,59 +3229,148 @@
           <a:p>
             <a:pPr algn="ctr"/>
             <a:r>
+              <a:rPr lang="en-US" dirty="0">
+                <a:solidFill>
+                  <a:schemeClr val="tx1"/>
+                </a:solidFill>
+              </a:rPr>
+              <a:t>Iteration 1</a:t>
+            </a:r>
+            <a:endParaRPr lang="en-SG" dirty="0">
+              <a:solidFill>
+                <a:schemeClr val="tx1"/>
+              </a:solidFill>
+            </a:endParaRPr>
+          </a:p>
+        </p:txBody>
+      </p:sp>
+      <p:cxnSp>
+        <p:nvCxnSpPr>
+          <p:cNvPr id="4" name="Straight Arrow Connector 3">
+            <a:extLst>
+              <a:ext uri="{FF2B5EF4-FFF2-40B4-BE49-F238E27FC236}">
+                <a16:creationId xmlns:a16="http://schemas.microsoft.com/office/drawing/2014/main" id="{9BBEB71C-F0E2-42C1-B5D1-32A60DFC741D}"/>
+              </a:ext>
+            </a:extLst>
+          </p:cNvPr>
+          <p:cNvCxnSpPr>
+            <a:cxnSpLocks/>
+            <a:stCxn id="2" idx="3"/>
+            <a:endCxn id="25" idx="0"/>
+          </p:cNvCxnSpPr>
+          <p:nvPr/>
+        </p:nvCxnSpPr>
+        <p:spPr>
+          <a:xfrm>
+            <a:off x="1475656" y="3665895"/>
+            <a:ext cx="446096" cy="514353"/>
+          </a:xfrm>
+          <a:prstGeom prst="straightConnector1">
+            <a:avLst/>
+          </a:prstGeom>
+          <a:ln>
+            <a:solidFill>
+              <a:schemeClr val="tx1"/>
+            </a:solidFill>
+            <a:tailEnd type="triangle"/>
+          </a:ln>
+        </p:spPr>
+        <p:style>
+          <a:lnRef idx="1">
+            <a:schemeClr val="accent1"/>
+          </a:lnRef>
+          <a:fillRef idx="0">
+            <a:schemeClr val="accent1"/>
+          </a:fillRef>
+          <a:effectRef idx="0">
+            <a:schemeClr val="accent1"/>
+          </a:effectRef>
+          <a:fontRef idx="minor">
+            <a:schemeClr val="tx1"/>
+          </a:fontRef>
+        </p:style>
+      </p:cxnSp>
+      <p:sp>
+        <p:nvSpPr>
+          <p:cNvPr id="41" name="Folded Corner 24">
+            <a:extLst>
+              <a:ext uri="{FF2B5EF4-FFF2-40B4-BE49-F238E27FC236}">
+                <a16:creationId xmlns:a16="http://schemas.microsoft.com/office/drawing/2014/main" id="{89E7CD1B-DD1F-432B-9A7C-4804F7B5A4B3}"/>
+              </a:ext>
+            </a:extLst>
+          </p:cNvPr>
+          <p:cNvSpPr/>
+          <p:nvPr/>
+        </p:nvSpPr>
+        <p:spPr>
+          <a:xfrm>
+            <a:off x="3445108" y="4130059"/>
+            <a:ext cx="749658" cy="512923"/>
+          </a:xfrm>
+          <a:prstGeom prst="cube">
+            <a:avLst/>
+          </a:prstGeom>
+        </p:spPr>
+        <p:style>
+          <a:lnRef idx="1">
+            <a:schemeClr val="accent6"/>
+          </a:lnRef>
+          <a:fillRef idx="2">
+            <a:schemeClr val="accent6"/>
+          </a:fillRef>
+          <a:effectRef idx="1">
+            <a:schemeClr val="accent6"/>
+          </a:effectRef>
+          <a:fontRef idx="minor">
+            <a:schemeClr val="dk1"/>
+          </a:fontRef>
+        </p:style>
+        <p:txBody>
+          <a:bodyPr rtlCol="0" anchor="ctr"/>
+          <a:lstStyle/>
+          <a:p>
+            <a:pPr algn="ctr"/>
+            <a:r>
               <a:rPr lang="en-US" sz="1800" dirty="0">
                 <a:solidFill>
                   <a:schemeClr val="tx1"/>
                 </a:solidFill>
               </a:rPr>
-              <a:t>n</a:t>
-            </a:r>
-            <a:r>
-              <a:rPr lang="en-US" sz="1800" baseline="30000" dirty="0">
-                <a:solidFill>
-                  <a:schemeClr val="tx1"/>
-                </a:solidFill>
-              </a:rPr>
-              <a:t>th</a:t>
-            </a:r>
-            <a:r>
-              <a:rPr lang="en-US" sz="1800" dirty="0">
-                <a:solidFill>
-                  <a:schemeClr val="tx1"/>
-                </a:solidFill>
-              </a:rPr>
-              <a:t> intermediate version</a:t>
-            </a:r>
-          </a:p>
-        </p:txBody>
-      </p:sp>
-      <p:sp>
-        <p:nvSpPr>
-          <p:cNvPr id="20" name="Rounded Rectangle 19"/>
+              <a:t>V0.2</a:t>
+            </a:r>
+          </a:p>
+        </p:txBody>
+      </p:sp>
+      <p:sp>
+        <p:nvSpPr>
+          <p:cNvPr id="42" name="Rectangle: Rounded Corners 41">
+            <a:extLst>
+              <a:ext uri="{FF2B5EF4-FFF2-40B4-BE49-F238E27FC236}">
+                <a16:creationId xmlns:a16="http://schemas.microsoft.com/office/drawing/2014/main" id="{8771B889-2865-4A1C-8EF1-C911E61776BF}"/>
+              </a:ext>
+            </a:extLst>
+          </p:cNvPr>
           <p:cNvSpPr/>
           <p:nvPr/>
         </p:nvSpPr>
         <p:spPr>
           <a:xfrm>
-            <a:off x="1037803" y="2445142"/>
-            <a:ext cx="2743200" cy="2133600"/>
+            <a:off x="2627784" y="3306804"/>
+            <a:ext cx="781829" cy="617806"/>
           </a:xfrm>
           <a:prstGeom prst="roundRect">
             <a:avLst/>
           </a:prstGeom>
-          <a:solidFill>
-            <a:schemeClr val="bg1"/>
-          </a:solidFill>
         </p:spPr>
         <p:style>
           <a:lnRef idx="1">
-            <a:schemeClr val="accent5"/>
+            <a:schemeClr val="accent4"/>
           </a:lnRef>
           <a:fillRef idx="2">
-            <a:schemeClr val="accent5"/>
+            <a:schemeClr val="accent4"/>
           </a:fillRef>
           <a:effectRef idx="1">
-            <a:schemeClr val="accent5"/>
+            <a:schemeClr val="accent4"/>
           </a:effectRef>
           <a:fontRef idx="minor">
             <a:schemeClr val="dk1"/>
@@ -3194,60 +3382,73 @@
           <a:p>
             <a:pPr algn="ctr"/>
             <a:r>
-              <a:rPr lang="en-US" sz="1800" b="1" dirty="0" smtClean="0"/>
-              <a:t>n</a:t>
-            </a:r>
-            <a:r>
-              <a:rPr lang="en-US" sz="1800" b="1" baseline="30000" dirty="0" smtClean="0"/>
-              <a:t>th</a:t>
-            </a:r>
-            <a:r>
-              <a:rPr lang="en-US" sz="1800" b="1" dirty="0" smtClean="0"/>
-              <a:t> Iteration</a:t>
-            </a:r>
-          </a:p>
-          <a:p>
-            <a:pPr>
-              <a:buFont typeface="Arial" charset="0"/>
-              <a:buChar char="•"/>
-            </a:pPr>
-            <a:r>
-              <a:rPr lang="en-US" sz="1800" dirty="0" smtClean="0"/>
-              <a:t>Evolve existing functionality</a:t>
-            </a:r>
-          </a:p>
-          <a:p>
-            <a:pPr>
-              <a:buFont typeface="Arial" charset="0"/>
-              <a:buChar char="•"/>
-            </a:pPr>
-            <a:r>
-              <a:rPr lang="en-US" sz="1800" dirty="0" smtClean="0"/>
-              <a:t>Add new subset of functionality</a:t>
-            </a:r>
-            <a:endParaRPr lang="en-US" sz="1800" dirty="0"/>
+              <a:rPr lang="en-US" dirty="0" err="1">
+                <a:solidFill>
+                  <a:schemeClr val="tx1"/>
+                </a:solidFill>
+              </a:rPr>
+              <a:t>Iter</a:t>
+            </a:r>
+            <a:r>
+              <a:rPr lang="en-US" dirty="0">
+                <a:solidFill>
+                  <a:schemeClr val="tx1"/>
+                </a:solidFill>
+              </a:rPr>
+              <a:t>. </a:t>
+            </a:r>
+            <a:br>
+              <a:rPr lang="en-US" dirty="0">
+                <a:solidFill>
+                  <a:schemeClr val="tx1"/>
+                </a:solidFill>
+              </a:rPr>
+            </a:br>
+            <a:r>
+              <a:rPr lang="en-US" dirty="0">
+                <a:solidFill>
+                  <a:schemeClr val="tx1"/>
+                </a:solidFill>
+              </a:rPr>
+              <a:t>2</a:t>
+            </a:r>
+            <a:endParaRPr lang="en-SG" dirty="0">
+              <a:solidFill>
+                <a:schemeClr val="tx1"/>
+              </a:solidFill>
+            </a:endParaRPr>
           </a:p>
         </p:txBody>
       </p:sp>
       <p:cxnSp>
         <p:nvCxnSpPr>
-          <p:cNvPr id="21" name="Straight Arrow Connector 20"/>
+          <p:cNvPr id="43" name="Straight Arrow Connector 42">
+            <a:extLst>
+              <a:ext uri="{FF2B5EF4-FFF2-40B4-BE49-F238E27FC236}">
+                <a16:creationId xmlns:a16="http://schemas.microsoft.com/office/drawing/2014/main" id="{DCEC755C-3C3C-4BD5-B32D-CB3A799A6ACA}"/>
+              </a:ext>
+            </a:extLst>
+          </p:cNvPr>
           <p:cNvCxnSpPr>
-            <a:stCxn id="20" idx="3"/>
-            <a:endCxn id="19" idx="1"/>
+            <a:cxnSpLocks/>
+            <a:stCxn id="42" idx="3"/>
+            <a:endCxn id="41" idx="0"/>
           </p:cNvCxnSpPr>
           <p:nvPr/>
         </p:nvCxnSpPr>
         <p:spPr>
           <a:xfrm>
-            <a:off x="3781003" y="3511942"/>
-            <a:ext cx="1524000" cy="1588"/>
+            <a:off x="3409613" y="3615707"/>
+            <a:ext cx="474439" cy="514352"/>
           </a:xfrm>
           <a:prstGeom prst="straightConnector1">
             <a:avLst/>
           </a:prstGeom>
           <a:ln>
-            <a:tailEnd type="arrow"/>
+            <a:solidFill>
+              <a:schemeClr val="tx1"/>
+            </a:solidFill>
+            <a:tailEnd type="triangle"/>
           </a:ln>
         </p:spPr>
         <p:style>
@@ -3267,25 +3468,31 @@
       </p:cxnSp>
       <p:cxnSp>
         <p:nvCxnSpPr>
-          <p:cNvPr id="22" name="Elbow Connector 21"/>
+          <p:cNvPr id="16" name="Connector: Elbow 15">
+            <a:extLst>
+              <a:ext uri="{FF2B5EF4-FFF2-40B4-BE49-F238E27FC236}">
+                <a16:creationId xmlns:a16="http://schemas.microsoft.com/office/drawing/2014/main" id="{BECEF08F-BACC-40B8-89F5-E51305AF647E}"/>
+              </a:ext>
+            </a:extLst>
+          </p:cNvPr>
           <p:cNvCxnSpPr>
-            <a:stCxn id="19" idx="2"/>
-            <a:endCxn id="20" idx="2"/>
+            <a:cxnSpLocks/>
+            <a:stCxn id="18" idx="1"/>
+            <a:endCxn id="42" idx="2"/>
           </p:cNvCxnSpPr>
           <p:nvPr/>
         </p:nvCxnSpPr>
         <p:spPr>
-          <a:xfrm rot="5400000">
-            <a:off x="4162003" y="2254642"/>
-            <a:ext cx="571500" cy="4076700"/>
+          <a:xfrm flipV="1">
+            <a:off x="2475919" y="3924610"/>
+            <a:ext cx="542780" cy="157298"/>
           </a:xfrm>
-          <a:prstGeom prst="bentConnector3">
-            <a:avLst>
-              <a:gd name="adj1" fmla="val 150159"/>
-            </a:avLst>
+          <a:prstGeom prst="bentConnector2">
+            <a:avLst/>
           </a:prstGeom>
           <a:ln>
-            <a:tailEnd type="arrow"/>
+            <a:prstDash val="dash"/>
+            <a:tailEnd type="triangle"/>
           </a:ln>
         </p:spPr>
         <p:style>
@@ -3305,13 +3512,66 @@
       </p:cxnSp>
       <p:sp>
         <p:nvSpPr>
-          <p:cNvPr id="23" name="Rectangle 22"/>
+          <p:cNvPr id="18" name="Left Brace 17">
+            <a:extLst>
+              <a:ext uri="{FF2B5EF4-FFF2-40B4-BE49-F238E27FC236}">
+                <a16:creationId xmlns:a16="http://schemas.microsoft.com/office/drawing/2014/main" id="{1703C3AF-660C-4401-9A6B-B807D5C27D54}"/>
+              </a:ext>
+            </a:extLst>
+          </p:cNvPr>
           <p:cNvSpPr/>
           <p:nvPr/>
         </p:nvSpPr>
         <p:spPr>
+          <a:xfrm rot="10800000">
+            <a:off x="2192175" y="3306803"/>
+            <a:ext cx="283744" cy="1550211"/>
+          </a:xfrm>
+          <a:prstGeom prst="leftBrace">
+            <a:avLst/>
+          </a:prstGeom>
+          <a:ln>
+            <a:prstDash val="dash"/>
+          </a:ln>
+        </p:spPr>
+        <p:style>
+          <a:lnRef idx="1">
+            <a:schemeClr val="accent1"/>
+          </a:lnRef>
+          <a:fillRef idx="0">
+            <a:schemeClr val="accent1"/>
+          </a:fillRef>
+          <a:effectRef idx="0">
+            <a:schemeClr val="accent1"/>
+          </a:effectRef>
+          <a:fontRef idx="minor">
+            <a:schemeClr val="tx1"/>
+          </a:fontRef>
+        </p:style>
+        <p:txBody>
+          <a:bodyPr rtlCol="0" anchor="ctr"/>
+          <a:lstStyle/>
+          <a:p>
+            <a:pPr algn="ctr"/>
+            <a:endParaRPr lang="en-SG"/>
+          </a:p>
+        </p:txBody>
+      </p:sp>
+      <p:sp>
+        <p:nvSpPr>
+          <p:cNvPr id="60" name="Rectangle 59">
+            <a:extLst>
+              <a:ext uri="{FF2B5EF4-FFF2-40B4-BE49-F238E27FC236}">
+                <a16:creationId xmlns:a16="http://schemas.microsoft.com/office/drawing/2014/main" id="{671428A1-0274-450B-AC6B-514047630686}"/>
+              </a:ext>
+            </a:extLst>
+          </p:cNvPr>
+          <p:cNvSpPr/>
+          <p:nvPr/>
+        </p:nvSpPr>
+        <p:spPr>
           <a:xfrm>
-            <a:off x="4009603" y="4273942"/>
+            <a:off x="4358875" y="4102561"/>
             <a:ext cx="1036502" cy="369332"/>
           </a:xfrm>
           <a:prstGeom prst="rect">
@@ -3325,54 +3585,85 @@
           <a:lstStyle/>
           <a:p>
             <a:r>
-              <a:rPr lang="en-US" sz="1800" dirty="0" smtClean="0"/>
+              <a:rPr lang="en-US" sz="1800" dirty="0">
+                <a:solidFill>
+                  <a:srgbClr val="0070C0"/>
+                </a:solidFill>
+              </a:rPr>
               <a:t>feedback</a:t>
             </a:r>
-            <a:endParaRPr lang="en-US" sz="1800" dirty="0"/>
-          </a:p>
-        </p:txBody>
-      </p:sp>
-      <p:sp>
-        <p:nvSpPr>
-          <p:cNvPr id="24" name="Rectangle 23"/>
+          </a:p>
+        </p:txBody>
+      </p:sp>
+      <p:sp>
+        <p:nvSpPr>
+          <p:cNvPr id="61" name="Folded Corner 24">
+            <a:extLst>
+              <a:ext uri="{FF2B5EF4-FFF2-40B4-BE49-F238E27FC236}">
+                <a16:creationId xmlns:a16="http://schemas.microsoft.com/office/drawing/2014/main" id="{BEFA4028-DD30-4A31-87D9-018B0554A40B}"/>
+              </a:ext>
+            </a:extLst>
+          </p:cNvPr>
           <p:cNvSpPr/>
           <p:nvPr/>
         </p:nvSpPr>
         <p:spPr>
           <a:xfrm>
-            <a:off x="4238203" y="4883542"/>
-            <a:ext cx="776175" cy="369332"/>
+            <a:off x="5430657" y="4130059"/>
+            <a:ext cx="785818" cy="605776"/>
           </a:xfrm>
-          <a:prstGeom prst="rect">
+          <a:prstGeom prst="cube">
             <a:avLst/>
           </a:prstGeom>
         </p:spPr>
-        <p:txBody>
-          <a:bodyPr wrap="none">
-            <a:spAutoFit/>
-          </a:bodyPr>
-          <a:lstStyle/>
-          <a:p>
-            <a:r>
-              <a:rPr lang="en-US" sz="1800" dirty="0" smtClean="0"/>
-              <a:t>n=n+1</a:t>
-            </a:r>
-            <a:endParaRPr lang="en-US" sz="1800" dirty="0"/>
-          </a:p>
-        </p:txBody>
-      </p:sp>
-      <p:sp>
-        <p:nvSpPr>
-          <p:cNvPr id="25" name="Folded Corner 24"/>
+        <p:style>
+          <a:lnRef idx="1">
+            <a:schemeClr val="accent6"/>
+          </a:lnRef>
+          <a:fillRef idx="2">
+            <a:schemeClr val="accent6"/>
+          </a:fillRef>
+          <a:effectRef idx="1">
+            <a:schemeClr val="accent6"/>
+          </a:effectRef>
+          <a:fontRef idx="minor">
+            <a:schemeClr val="dk1"/>
+          </a:fontRef>
+        </p:style>
+        <p:txBody>
+          <a:bodyPr rtlCol="0" anchor="ctr"/>
+          <a:lstStyle/>
+          <a:p>
+            <a:pPr algn="ctr"/>
+            <a:r>
+              <a:rPr lang="en-US" sz="1800" dirty="0">
+                <a:solidFill>
+                  <a:schemeClr val="tx1"/>
+                </a:solidFill>
+              </a:rPr>
+              <a:t>V0.3</a:t>
+            </a:r>
+          </a:p>
+        </p:txBody>
+      </p:sp>
+      <p:sp>
+        <p:nvSpPr>
+          <p:cNvPr id="62" name="Rectangle: Rounded Corners 61">
+            <a:extLst>
+              <a:ext uri="{FF2B5EF4-FFF2-40B4-BE49-F238E27FC236}">
+                <a16:creationId xmlns:a16="http://schemas.microsoft.com/office/drawing/2014/main" id="{91241178-8067-48DD-BC92-634DEA1EEB3A}"/>
+              </a:ext>
+            </a:extLst>
+          </p:cNvPr>
           <p:cNvSpPr/>
           <p:nvPr/>
         </p:nvSpPr>
         <p:spPr>
           <a:xfrm>
-            <a:off x="784786" y="995817"/>
-            <a:ext cx="1188720" cy="457200"/>
+            <a:off x="4583638" y="3298379"/>
+            <a:ext cx="796374" cy="617806"/>
           </a:xfrm>
-          <a:prstGeom prst="foldedCorner">
+          <a:prstGeom prst="roundRect">
             <a:avLst/>
           </a:prstGeom>
         </p:spPr>
@@ -3396,14 +3687,37 @@
           <a:p>
             <a:pPr algn="ctr"/>
             <a:r>
-              <a:rPr lang="en-US" sz="1800" dirty="0" smtClean="0">
+              <a:rPr lang="en-US" dirty="0" err="1">
                 <a:solidFill>
                   <a:schemeClr val="tx1"/>
                 </a:solidFill>
               </a:rPr>
-              <a:t>V0.1</a:t>
-            </a:r>
-            <a:endParaRPr lang="en-US" sz="1800" dirty="0">
+              <a:t>Iter</a:t>
+            </a:r>
+            <a:r>
+              <a:rPr lang="en-US" dirty="0">
+                <a:solidFill>
+                  <a:schemeClr val="tx1"/>
+                </a:solidFill>
+              </a:rPr>
+              <a:t>.</a:t>
+            </a:r>
+            <a:br>
+              <a:rPr lang="en-US" dirty="0">
+                <a:solidFill>
+                  <a:schemeClr val="tx1"/>
+                </a:solidFill>
+              </a:rPr>
+            </a:br>
+            <a:r>
+              <a:rPr lang="en-US" dirty="0">
+                <a:solidFill>
+                  <a:schemeClr val="tx1"/>
+                </a:solidFill>
+              </a:rPr>
+              <a:t> 3</a:t>
+            </a:r>
+            <a:endParaRPr lang="en-SG" dirty="0">
               <a:solidFill>
                 <a:schemeClr val="tx1"/>
               </a:solidFill>
@@ -3411,359 +3725,35 @@
           </a:p>
         </p:txBody>
       </p:sp>
-      <p:sp>
-        <p:nvSpPr>
-          <p:cNvPr id="26" name="Folded Corner 25"/>
-          <p:cNvSpPr/>
-          <p:nvPr/>
-        </p:nvSpPr>
-        <p:spPr>
-          <a:xfrm>
-            <a:off x="2687781" y="931649"/>
-            <a:ext cx="1188720" cy="585536"/>
-          </a:xfrm>
-          <a:prstGeom prst="foldedCorner">
-            <a:avLst/>
-          </a:prstGeom>
-        </p:spPr>
-        <p:style>
-          <a:lnRef idx="1">
-            <a:schemeClr val="accent4"/>
-          </a:lnRef>
-          <a:fillRef idx="2">
-            <a:schemeClr val="accent4"/>
-          </a:fillRef>
-          <a:effectRef idx="1">
-            <a:schemeClr val="accent4"/>
-          </a:effectRef>
-          <a:fontRef idx="minor">
-            <a:schemeClr val="dk1"/>
-          </a:fontRef>
-        </p:style>
-        <p:txBody>
-          <a:bodyPr rtlCol="0" anchor="ctr"/>
-          <a:lstStyle/>
-          <a:p>
-            <a:pPr algn="ctr"/>
-            <a:r>
-              <a:rPr lang="en-US" sz="1800" dirty="0" smtClean="0">
-                <a:solidFill>
-                  <a:schemeClr val="tx1"/>
-                </a:solidFill>
-              </a:rPr>
-              <a:t>V0.2</a:t>
-            </a:r>
-            <a:endParaRPr lang="en-US" sz="1800" dirty="0">
-              <a:solidFill>
-                <a:schemeClr val="tx1"/>
-              </a:solidFill>
-            </a:endParaRPr>
-          </a:p>
-        </p:txBody>
-      </p:sp>
-      <p:sp>
-        <p:nvSpPr>
-          <p:cNvPr id="27" name="Folded Corner 26"/>
-          <p:cNvSpPr/>
-          <p:nvPr/>
-        </p:nvSpPr>
-        <p:spPr>
-          <a:xfrm>
-            <a:off x="6752436" y="779249"/>
-            <a:ext cx="1188720" cy="890336"/>
-          </a:xfrm>
-          <a:prstGeom prst="foldedCorner">
-            <a:avLst/>
-          </a:prstGeom>
-        </p:spPr>
-        <p:style>
-          <a:lnRef idx="1">
-            <a:schemeClr val="accent4"/>
-          </a:lnRef>
-          <a:fillRef idx="2">
-            <a:schemeClr val="accent4"/>
-          </a:fillRef>
-          <a:effectRef idx="1">
-            <a:schemeClr val="accent4"/>
-          </a:effectRef>
-          <a:fontRef idx="minor">
-            <a:schemeClr val="dk1"/>
-          </a:fontRef>
-        </p:style>
-        <p:txBody>
-          <a:bodyPr rtlCol="0" anchor="ctr"/>
-          <a:lstStyle/>
-          <a:p>
-            <a:pPr algn="ctr"/>
-            <a:r>
-              <a:rPr lang="en-US" sz="1800" b="1" dirty="0" smtClean="0">
-                <a:solidFill>
-                  <a:schemeClr val="tx1"/>
-                </a:solidFill>
-              </a:rPr>
-              <a:t>V1.0</a:t>
-            </a:r>
-            <a:endParaRPr lang="en-US" sz="1800" b="1" dirty="0">
-              <a:solidFill>
-                <a:schemeClr val="tx1"/>
-              </a:solidFill>
-            </a:endParaRPr>
-          </a:p>
-        </p:txBody>
-      </p:sp>
       <p:cxnSp>
         <p:nvCxnSpPr>
-          <p:cNvPr id="28" name="Shape 36"/>
-          <p:cNvCxnSpPr/>
+          <p:cNvPr id="63" name="Straight Arrow Connector 62">
+            <a:extLst>
+              <a:ext uri="{FF2B5EF4-FFF2-40B4-BE49-F238E27FC236}">
+                <a16:creationId xmlns:a16="http://schemas.microsoft.com/office/drawing/2014/main" id="{ACD4339C-5AB4-43C9-91BD-71D01A0C3950}"/>
+              </a:ext>
+            </a:extLst>
+          </p:cNvPr>
+          <p:cNvCxnSpPr>
+            <a:cxnSpLocks/>
+            <a:stCxn id="62" idx="3"/>
+            <a:endCxn id="61" idx="0"/>
+          </p:cNvCxnSpPr>
           <p:nvPr/>
         </p:nvCxnSpPr>
         <p:spPr>
           <a:xfrm>
-            <a:off x="1973506" y="1224417"/>
-            <a:ext cx="714275" cy="1588"/>
+            <a:off x="5380012" y="3607282"/>
+            <a:ext cx="519276" cy="522777"/>
           </a:xfrm>
-          <a:prstGeom prst="bentConnector3">
-            <a:avLst>
-              <a:gd name="adj1" fmla="val 50000"/>
-            </a:avLst>
+          <a:prstGeom prst="straightConnector1">
+            <a:avLst/>
           </a:prstGeom>
           <a:ln>
-            <a:tailEnd type="arrow"/>
-          </a:ln>
-        </p:spPr>
-        <p:style>
-          <a:lnRef idx="1">
-            <a:schemeClr val="accent4"/>
-          </a:lnRef>
-          <a:fillRef idx="2">
-            <a:schemeClr val="accent4"/>
-          </a:fillRef>
-          <a:effectRef idx="1">
-            <a:schemeClr val="accent4"/>
-          </a:effectRef>
-          <a:fontRef idx="minor">
-            <a:schemeClr val="dk1"/>
-          </a:fontRef>
-        </p:style>
-      </p:cxnSp>
-      <p:cxnSp>
-        <p:nvCxnSpPr>
-          <p:cNvPr id="29" name="Shape 37"/>
-          <p:cNvCxnSpPr/>
-          <p:nvPr/>
-        </p:nvCxnSpPr>
-        <p:spPr>
-          <a:xfrm flipV="1">
-            <a:off x="5966386" y="1224417"/>
-            <a:ext cx="786050" cy="4010"/>
-          </a:xfrm>
-          <a:prstGeom prst="bentConnector3">
-            <a:avLst>
-              <a:gd name="adj1" fmla="val 50000"/>
-            </a:avLst>
-          </a:prstGeom>
-          <a:ln>
-            <a:tailEnd type="arrow"/>
-          </a:ln>
-        </p:spPr>
-        <p:style>
-          <a:lnRef idx="1">
-            <a:schemeClr val="accent4"/>
-          </a:lnRef>
-          <a:fillRef idx="2">
-            <a:schemeClr val="accent4"/>
-          </a:fillRef>
-          <a:effectRef idx="1">
-            <a:schemeClr val="accent4"/>
-          </a:effectRef>
-          <a:fontRef idx="minor">
-            <a:schemeClr val="dk1"/>
-          </a:fontRef>
-        </p:style>
-      </p:cxnSp>
-      <p:sp>
-        <p:nvSpPr>
-          <p:cNvPr id="30" name="Folded Corner 29"/>
-          <p:cNvSpPr/>
-          <p:nvPr/>
-        </p:nvSpPr>
-        <p:spPr>
-          <a:xfrm>
-            <a:off x="4588770" y="855448"/>
-            <a:ext cx="1188720" cy="737938"/>
-          </a:xfrm>
-          <a:prstGeom prst="foldedCorner">
-            <a:avLst/>
-          </a:prstGeom>
-        </p:spPr>
-        <p:style>
-          <a:lnRef idx="1">
-            <a:schemeClr val="accent4"/>
-          </a:lnRef>
-          <a:fillRef idx="2">
-            <a:schemeClr val="accent4"/>
-          </a:fillRef>
-          <a:effectRef idx="1">
-            <a:schemeClr val="accent4"/>
-          </a:effectRef>
-          <a:fontRef idx="minor">
-            <a:schemeClr val="dk1"/>
-          </a:fontRef>
-        </p:style>
-        <p:txBody>
-          <a:bodyPr rtlCol="0" anchor="ctr"/>
-          <a:lstStyle/>
-          <a:p>
-            <a:pPr algn="ctr"/>
-            <a:r>
-              <a:rPr lang="en-US" sz="1800" dirty="0" smtClean="0">
-                <a:solidFill>
-                  <a:schemeClr val="tx1"/>
-                </a:solidFill>
-              </a:rPr>
-              <a:t>V0.3</a:t>
-            </a:r>
-            <a:endParaRPr lang="en-US" sz="1800" dirty="0">
-              <a:solidFill>
-                <a:schemeClr val="tx1"/>
-              </a:solidFill>
-            </a:endParaRPr>
-          </a:p>
-        </p:txBody>
-      </p:sp>
-      <p:cxnSp>
-        <p:nvCxnSpPr>
-          <p:cNvPr id="31" name="Shape 36"/>
-          <p:cNvCxnSpPr/>
-          <p:nvPr/>
-        </p:nvCxnSpPr>
-        <p:spPr>
-          <a:xfrm>
-            <a:off x="3876501" y="1224417"/>
-            <a:ext cx="712269" cy="1588"/>
-          </a:xfrm>
-          <a:prstGeom prst="bentConnector3">
-            <a:avLst>
-              <a:gd name="adj1" fmla="val 50000"/>
-            </a:avLst>
-          </a:prstGeom>
-          <a:ln>
-            <a:tailEnd type="arrow"/>
-          </a:ln>
-        </p:spPr>
-        <p:style>
-          <a:lnRef idx="1">
-            <a:schemeClr val="accent4"/>
-          </a:lnRef>
-          <a:fillRef idx="2">
-            <a:schemeClr val="accent4"/>
-          </a:fillRef>
-          <a:effectRef idx="1">
-            <a:schemeClr val="accent4"/>
-          </a:effectRef>
-          <a:fontRef idx="minor">
-            <a:schemeClr val="dk1"/>
-          </a:fontRef>
-        </p:style>
-      </p:cxnSp>
-      <p:cxnSp>
-        <p:nvCxnSpPr>
-          <p:cNvPr id="32" name="Shape 36"/>
-          <p:cNvCxnSpPr>
-            <a:endCxn id="33" idx="1"/>
-          </p:cNvCxnSpPr>
-          <p:nvPr/>
-        </p:nvCxnSpPr>
-        <p:spPr>
-          <a:xfrm rot="16200000" flipH="1">
-            <a:off x="1246306" y="1585855"/>
-            <a:ext cx="617805" cy="352126"/>
-          </a:xfrm>
-          <a:prstGeom prst="bentConnector2">
-            <a:avLst/>
-          </a:prstGeom>
-          <a:ln w="12700">
             <a:solidFill>
-              <a:srgbClr val="0070C0"/>
+              <a:schemeClr val="tx1"/>
             </a:solidFill>
-            <a:prstDash val="sysDash"/>
-            <a:tailEnd type="arrow"/>
-          </a:ln>
-        </p:spPr>
-        <p:style>
-          <a:lnRef idx="1">
-            <a:schemeClr val="accent1"/>
-          </a:lnRef>
-          <a:fillRef idx="0">
-            <a:schemeClr val="accent1"/>
-          </a:fillRef>
-          <a:effectRef idx="0">
-            <a:schemeClr val="accent1"/>
-          </a:effectRef>
-          <a:fontRef idx="minor">
-            <a:schemeClr val="tx1"/>
-          </a:fontRef>
-        </p:style>
-      </p:cxnSp>
-      <p:sp>
-        <p:nvSpPr>
-          <p:cNvPr id="33" name="Rectangle 32"/>
-          <p:cNvSpPr/>
-          <p:nvPr/>
-        </p:nvSpPr>
-        <p:spPr>
-          <a:xfrm>
-            <a:off x="1731271" y="1886155"/>
-            <a:ext cx="1036502" cy="369332"/>
-          </a:xfrm>
-          <a:prstGeom prst="rect">
-            <a:avLst/>
-          </a:prstGeom>
-        </p:spPr>
-        <p:txBody>
-          <a:bodyPr wrap="none">
-            <a:spAutoFit/>
-          </a:bodyPr>
-          <a:lstStyle/>
-          <a:p>
-            <a:r>
-              <a:rPr lang="en-US" sz="1800" dirty="0" smtClean="0">
-                <a:solidFill>
-                  <a:srgbClr val="0070C0"/>
-                </a:solidFill>
-              </a:rPr>
-              <a:t>feedback</a:t>
-            </a:r>
-            <a:endParaRPr lang="en-US" sz="1800" dirty="0">
-              <a:solidFill>
-                <a:srgbClr val="0070C0"/>
-              </a:solidFill>
-            </a:endParaRPr>
-          </a:p>
-        </p:txBody>
-      </p:sp>
-      <p:cxnSp>
-        <p:nvCxnSpPr>
-          <p:cNvPr id="34" name="Shape 36"/>
-          <p:cNvCxnSpPr>
-            <a:stCxn id="33" idx="3"/>
-          </p:cNvCxnSpPr>
-          <p:nvPr/>
-        </p:nvCxnSpPr>
-        <p:spPr>
-          <a:xfrm flipV="1">
-            <a:off x="2767773" y="1517186"/>
-            <a:ext cx="514368" cy="553635"/>
-          </a:xfrm>
-          <a:prstGeom prst="bentConnector2">
-            <a:avLst/>
-          </a:prstGeom>
-          <a:ln w="12700">
-            <a:solidFill>
-              <a:srgbClr val="0070C0"/>
-            </a:solidFill>
-            <a:prstDash val="sysDash"/>
-            <a:tailEnd type="arrow"/>
+            <a:tailEnd type="triangle"/>
           </a:ln>
         </p:spPr>
         <p:style>
@@ -3783,26 +3773,30 @@
       </p:cxnSp>
       <p:cxnSp>
         <p:nvCxnSpPr>
-          <p:cNvPr id="35" name="Shape 36"/>
+          <p:cNvPr id="64" name="Connector: Elbow 63">
+            <a:extLst>
+              <a:ext uri="{FF2B5EF4-FFF2-40B4-BE49-F238E27FC236}">
+                <a16:creationId xmlns:a16="http://schemas.microsoft.com/office/drawing/2014/main" id="{BDD04DAF-010C-48AB-9CCC-D98A587993D2}"/>
+              </a:ext>
+            </a:extLst>
+          </p:cNvPr>
           <p:cNvCxnSpPr>
-            <a:endCxn id="36" idx="1"/>
+            <a:cxnSpLocks/>
+            <a:endCxn id="62" idx="2"/>
           </p:cNvCxnSpPr>
           <p:nvPr/>
         </p:nvCxnSpPr>
         <p:spPr>
-          <a:xfrm rot="16200000" flipH="1">
-            <a:off x="3436053" y="1658044"/>
-            <a:ext cx="617805" cy="352126"/>
+          <a:xfrm flipV="1">
+            <a:off x="4355976" y="3916185"/>
+            <a:ext cx="625849" cy="157298"/>
           </a:xfrm>
           <a:prstGeom prst="bentConnector2">
             <a:avLst/>
           </a:prstGeom>
-          <a:ln w="12700">
-            <a:solidFill>
-              <a:srgbClr val="0070C0"/>
-            </a:solidFill>
-            <a:prstDash val="sysDash"/>
-            <a:tailEnd type="arrow"/>
+          <a:ln>
+            <a:prstDash val="dash"/>
+            <a:tailEnd type="triangle"/>
           </a:ln>
         </p:spPr>
         <p:style>
@@ -3822,36 +3816,179 @@
       </p:cxnSp>
       <p:sp>
         <p:nvSpPr>
-          <p:cNvPr id="36" name="Rectangle 35"/>
+          <p:cNvPr id="65" name="Left Brace 64">
+            <a:extLst>
+              <a:ext uri="{FF2B5EF4-FFF2-40B4-BE49-F238E27FC236}">
+                <a16:creationId xmlns:a16="http://schemas.microsoft.com/office/drawing/2014/main" id="{19DCA096-59AD-4766-B01B-A039D9CD31A5}"/>
+              </a:ext>
+            </a:extLst>
+          </p:cNvPr>
           <p:cNvSpPr/>
           <p:nvPr/>
         </p:nvSpPr>
         <p:spPr>
+          <a:xfrm rot="10800000">
+            <a:off x="4197914" y="3298378"/>
+            <a:ext cx="283744" cy="1550211"/>
+          </a:xfrm>
+          <a:prstGeom prst="leftBrace">
+            <a:avLst/>
+          </a:prstGeom>
+          <a:ln>
+            <a:prstDash val="dash"/>
+          </a:ln>
+        </p:spPr>
+        <p:style>
+          <a:lnRef idx="1">
+            <a:schemeClr val="accent1"/>
+          </a:lnRef>
+          <a:fillRef idx="0">
+            <a:schemeClr val="accent1"/>
+          </a:fillRef>
+          <a:effectRef idx="0">
+            <a:schemeClr val="accent1"/>
+          </a:effectRef>
+          <a:fontRef idx="minor">
+            <a:schemeClr val="tx1"/>
+          </a:fontRef>
+        </p:style>
+        <p:txBody>
+          <a:bodyPr rtlCol="0" anchor="ctr"/>
+          <a:lstStyle/>
+          <a:p>
+            <a:pPr algn="ctr"/>
+            <a:endParaRPr lang="en-SG"/>
+          </a:p>
+        </p:txBody>
+      </p:sp>
+      <p:sp>
+        <p:nvSpPr>
+          <p:cNvPr id="69" name="Folded Corner 24">
+            <a:extLst>
+              <a:ext uri="{FF2B5EF4-FFF2-40B4-BE49-F238E27FC236}">
+                <a16:creationId xmlns:a16="http://schemas.microsoft.com/office/drawing/2014/main" id="{21768DE3-0258-4410-9982-99C0004B1CCC}"/>
+              </a:ext>
+            </a:extLst>
+          </p:cNvPr>
+          <p:cNvSpPr/>
+          <p:nvPr/>
+        </p:nvSpPr>
+        <p:spPr>
           <a:xfrm>
-            <a:off x="3921018" y="1958344"/>
-            <a:ext cx="1036502" cy="369332"/>
+            <a:off x="7719763" y="4065161"/>
+            <a:ext cx="823259" cy="783427"/>
           </a:xfrm>
-          <a:prstGeom prst="rect">
+          <a:prstGeom prst="cube">
+            <a:avLst/>
+          </a:prstGeom>
+          <a:solidFill>
+            <a:schemeClr val="accent6"/>
+          </a:solidFill>
+        </p:spPr>
+        <p:style>
+          <a:lnRef idx="1">
+            <a:schemeClr val="accent6"/>
+          </a:lnRef>
+          <a:fillRef idx="2">
+            <a:schemeClr val="accent6"/>
+          </a:fillRef>
+          <a:effectRef idx="1">
+            <a:schemeClr val="accent6"/>
+          </a:effectRef>
+          <a:fontRef idx="minor">
+            <a:schemeClr val="dk1"/>
+          </a:fontRef>
+        </p:style>
+        <p:txBody>
+          <a:bodyPr rtlCol="0" anchor="ctr"/>
+          <a:lstStyle/>
+          <a:p>
+            <a:pPr algn="ctr"/>
+            <a:r>
+              <a:rPr lang="en-US" sz="1800" dirty="0">
+                <a:solidFill>
+                  <a:schemeClr val="tx1"/>
+                </a:solidFill>
+              </a:rPr>
+              <a:t>V1.0</a:t>
+            </a:r>
+          </a:p>
+        </p:txBody>
+      </p:sp>
+      <p:sp>
+        <p:nvSpPr>
+          <p:cNvPr id="70" name="Rectangle: Rounded Corners 69">
+            <a:extLst>
+              <a:ext uri="{FF2B5EF4-FFF2-40B4-BE49-F238E27FC236}">
+                <a16:creationId xmlns:a16="http://schemas.microsoft.com/office/drawing/2014/main" id="{26F43B44-22A2-47F9-8AFB-01CFF1205FF2}"/>
+              </a:ext>
+            </a:extLst>
+          </p:cNvPr>
+          <p:cNvSpPr/>
+          <p:nvPr/>
+        </p:nvSpPr>
+        <p:spPr>
+          <a:xfrm>
+            <a:off x="6887894" y="3241907"/>
+            <a:ext cx="796375" cy="617806"/>
+          </a:xfrm>
+          <a:prstGeom prst="roundRect">
             <a:avLst/>
           </a:prstGeom>
         </p:spPr>
-        <p:txBody>
-          <a:bodyPr wrap="none">
-            <a:spAutoFit/>
-          </a:bodyPr>
-          <a:lstStyle/>
-          <a:p>
-            <a:r>
-              <a:rPr lang="en-US" sz="1800" dirty="0" smtClean="0">
+        <p:style>
+          <a:lnRef idx="1">
+            <a:schemeClr val="accent4"/>
+          </a:lnRef>
+          <a:fillRef idx="2">
+            <a:schemeClr val="accent4"/>
+          </a:fillRef>
+          <a:effectRef idx="1">
+            <a:schemeClr val="accent4"/>
+          </a:effectRef>
+          <a:fontRef idx="minor">
+            <a:schemeClr val="dk1"/>
+          </a:fontRef>
+        </p:style>
+        <p:txBody>
+          <a:bodyPr rtlCol="0" anchor="ctr"/>
+          <a:lstStyle/>
+          <a:p>
+            <a:pPr algn="ctr"/>
+            <a:r>
+              <a:rPr lang="en-US" dirty="0" err="1">
                 <a:solidFill>
-                  <a:srgbClr val="0070C0"/>
+                  <a:schemeClr val="tx1"/>
                 </a:solidFill>
               </a:rPr>
-              <a:t>feedback</a:t>
-            </a:r>
-            <a:endParaRPr lang="en-US" sz="1800" dirty="0">
+              <a:t>Iter</a:t>
+            </a:r>
+            <a:r>
+              <a:rPr lang="en-US" dirty="0">
+                <a:solidFill>
+                  <a:schemeClr val="tx1"/>
+                </a:solidFill>
+              </a:rPr>
+              <a:t>.</a:t>
+            </a:r>
+            <a:br>
+              <a:rPr lang="en-US" dirty="0">
+                <a:solidFill>
+                  <a:schemeClr val="tx1"/>
+                </a:solidFill>
+              </a:rPr>
+            </a:br>
+            <a:r>
+              <a:rPr lang="en-US" dirty="0">
+                <a:solidFill>
+                  <a:schemeClr val="tx1"/>
+                </a:solidFill>
+              </a:rPr>
+              <a:t> n</a:t>
+            </a:r>
+            <a:endParaRPr lang="en-SG" dirty="0">
               <a:solidFill>
-                <a:srgbClr val="0070C0"/>
+                <a:schemeClr val="tx1"/>
               </a:solidFill>
             </a:endParaRPr>
           </a:p>
@@ -3859,26 +3996,33 @@
       </p:sp>
       <p:cxnSp>
         <p:nvCxnSpPr>
-          <p:cNvPr id="37" name="Shape 36"/>
+          <p:cNvPr id="71" name="Straight Arrow Connector 70">
+            <a:extLst>
+              <a:ext uri="{FF2B5EF4-FFF2-40B4-BE49-F238E27FC236}">
+                <a16:creationId xmlns:a16="http://schemas.microsoft.com/office/drawing/2014/main" id="{14D411C7-FBBA-421C-9698-EFBD72F02122}"/>
+              </a:ext>
+            </a:extLst>
+          </p:cNvPr>
           <p:cNvCxnSpPr>
-            <a:stCxn id="36" idx="3"/>
+            <a:cxnSpLocks/>
+            <a:stCxn id="70" idx="3"/>
+            <a:endCxn id="69" idx="0"/>
           </p:cNvCxnSpPr>
           <p:nvPr/>
         </p:nvCxnSpPr>
         <p:spPr>
-          <a:xfrm flipV="1">
-            <a:off x="4957520" y="1589375"/>
-            <a:ext cx="514368" cy="553635"/>
+          <a:xfrm>
+            <a:off x="7684269" y="3550810"/>
+            <a:ext cx="545052" cy="514351"/>
           </a:xfrm>
-          <a:prstGeom prst="bentConnector2">
+          <a:prstGeom prst="straightConnector1">
             <a:avLst/>
           </a:prstGeom>
-          <a:ln w="12700">
+          <a:ln>
             <a:solidFill>
-              <a:srgbClr val="0070C0"/>
+              <a:schemeClr val="tx1"/>
             </a:solidFill>
-            <a:prstDash val="sysDash"/>
-            <a:tailEnd type="arrow"/>
+            <a:tailEnd type="triangle"/>
           </a:ln>
         </p:spPr>
         <p:style>
@@ -3896,6 +4040,86 @@
           </a:fontRef>
         </p:style>
       </p:cxnSp>
+      <p:cxnSp>
+        <p:nvCxnSpPr>
+          <p:cNvPr id="80" name="Connector: Elbow 79">
+            <a:extLst>
+              <a:ext uri="{FF2B5EF4-FFF2-40B4-BE49-F238E27FC236}">
+                <a16:creationId xmlns:a16="http://schemas.microsoft.com/office/drawing/2014/main" id="{DCED17CC-83AA-45E1-82EE-4529718AAF92}"/>
+              </a:ext>
+            </a:extLst>
+          </p:cNvPr>
+          <p:cNvCxnSpPr>
+            <a:cxnSpLocks/>
+          </p:cNvCxnSpPr>
+          <p:nvPr/>
+        </p:nvCxnSpPr>
+        <p:spPr>
+          <a:xfrm flipV="1">
+            <a:off x="6660232" y="3883788"/>
+            <a:ext cx="625849" cy="157298"/>
+          </a:xfrm>
+          <a:prstGeom prst="bentConnector2">
+            <a:avLst/>
+          </a:prstGeom>
+          <a:ln>
+            <a:prstDash val="dash"/>
+            <a:tailEnd type="triangle"/>
+          </a:ln>
+        </p:spPr>
+        <p:style>
+          <a:lnRef idx="1">
+            <a:schemeClr val="accent1"/>
+          </a:lnRef>
+          <a:fillRef idx="0">
+            <a:schemeClr val="accent1"/>
+          </a:fillRef>
+          <a:effectRef idx="0">
+            <a:schemeClr val="accent1"/>
+          </a:effectRef>
+          <a:fontRef idx="minor">
+            <a:schemeClr val="tx1"/>
+          </a:fontRef>
+        </p:style>
+      </p:cxnSp>
+      <p:sp>
+        <p:nvSpPr>
+          <p:cNvPr id="82" name="Rectangle 81">
+            <a:extLst>
+              <a:ext uri="{FF2B5EF4-FFF2-40B4-BE49-F238E27FC236}">
+                <a16:creationId xmlns:a16="http://schemas.microsoft.com/office/drawing/2014/main" id="{A9E2EFCF-146B-40DD-B4E7-001018BD3213}"/>
+              </a:ext>
+            </a:extLst>
+          </p:cNvPr>
+          <p:cNvSpPr/>
+          <p:nvPr/>
+        </p:nvSpPr>
+        <p:spPr>
+          <a:xfrm>
+            <a:off x="6171160" y="3356992"/>
+            <a:ext cx="343364" cy="369332"/>
+          </a:xfrm>
+          <a:prstGeom prst="rect">
+            <a:avLst/>
+          </a:prstGeom>
+        </p:spPr>
+        <p:txBody>
+          <a:bodyPr wrap="square">
+            <a:spAutoFit/>
+          </a:bodyPr>
+          <a:lstStyle/>
+          <a:p>
+            <a:r>
+              <a:rPr lang="en-US" sz="1800" dirty="0">
+                <a:solidFill>
+                  <a:srgbClr val="0070C0"/>
+                </a:solidFill>
+              </a:rPr>
+              <a:t>…</a:t>
+            </a:r>
+          </a:p>
+        </p:txBody>
+      </p:sp>
     </p:spTree>
     <p:extLst>
       <p:ext uri="{BB962C8B-B14F-4D97-AF65-F5344CB8AC3E}">

</xml_diff>